<commit_message>
Add google maps directions support
</commit_message>
<xml_diff>
--- a/GoogleEarth/Google Earth Initiative.pptx
+++ b/GoogleEarth/Google Earth Initiative.pptx
@@ -4332,8 +4332,13 @@
             </a:pPr>
             <a:r>
               <a:rPr lang="en-US" dirty="0" smtClean="0"/>
-              <a:t>KML support in API</a:t>
-            </a:r>
+              <a:t>KML </a:t>
+            </a:r>
+            <a:r>
+              <a:rPr lang="en-US" dirty="0" smtClean="0"/>
+              <a:t>support</a:t>
+            </a:r>
+            <a:endParaRPr lang="en-US" dirty="0" smtClean="0"/>
           </a:p>
           <a:p>
             <a:pPr>
@@ -4393,11 +4398,7 @@
             </a:pPr>
             <a:r>
               <a:rPr lang="en-US" dirty="0" smtClean="0"/>
-              <a:t>API functionality, map </a:t>
-            </a:r>
-            <a:r>
-              <a:rPr lang="en-US" dirty="0" smtClean="0"/>
-              <a:t>tiles, external KML data</a:t>
+              <a:t>API functionality, map tiles, external KML data</a:t>
             </a:r>
           </a:p>
           <a:p>
@@ -4427,13 +4428,8 @@
             </a:pPr>
             <a:r>
               <a:rPr lang="en-US" dirty="0" smtClean="0"/>
-              <a:t>Free version has transaction </a:t>
-            </a:r>
-            <a:r>
-              <a:rPr lang="en-US" dirty="0" smtClean="0"/>
-              <a:t>limits for certain functionality (e.g. geocoding)</a:t>
-            </a:r>
-            <a:endParaRPr lang="en-US" dirty="0" smtClean="0"/>
+              <a:t>Free version has transaction limits for certain functionality (e.g. geocoding)</a:t>
+            </a:r>
           </a:p>
           <a:p>
             <a:pPr>
@@ -4442,19 +4438,7 @@
             </a:pPr>
             <a:r>
               <a:rPr lang="en-US" dirty="0" smtClean="0"/>
-              <a:t>Google Earth Pro </a:t>
-            </a:r>
-            <a:r>
-              <a:rPr lang="en-US" dirty="0" smtClean="0"/>
-              <a:t>license </a:t>
-            </a:r>
-            <a:r>
-              <a:rPr lang="en-US" dirty="0" smtClean="0"/>
-              <a:t>$400/</a:t>
-            </a:r>
-            <a:r>
-              <a:rPr lang="en-US" dirty="0" smtClean="0"/>
-              <a:t>year</a:t>
+              <a:t>Google Earth Pro license $400/year</a:t>
             </a:r>
           </a:p>
           <a:p>
@@ -4464,7 +4448,7 @@
             </a:pPr>
             <a:r>
               <a:rPr lang="en-US" dirty="0" smtClean="0"/>
-              <a:t>Less transaction limits</a:t>
+              <a:t> Increased transactions</a:t>
             </a:r>
             <a:endParaRPr lang="en-US" dirty="0" smtClean="0"/>
           </a:p>
@@ -4770,8 +4754,8 @@
         </p:nvSpPr>
         <p:spPr>
           <a:xfrm>
-            <a:off x="824885" y="2057400"/>
-            <a:ext cx="2185214" cy="369332"/>
+            <a:off x="914400" y="1981200"/>
+            <a:ext cx="1851789" cy="646331"/>
           </a:xfrm>
           <a:prstGeom prst="rect">
             <a:avLst/>
@@ -4786,8 +4770,23 @@
           <a:p>
             <a:r>
               <a:rPr lang="en-US" dirty="0" smtClean="0"/>
-              <a:t>HTML/JavaScript/CSS</a:t>
-            </a:r>
+              <a:t>HTML/JavaScript</a:t>
+            </a:r>
+            <a:r>
+              <a:rPr lang="en-US" dirty="0" smtClean="0"/>
+              <a:t>/</a:t>
+            </a:r>
+          </a:p>
+          <a:p>
+            <a:r>
+              <a:rPr lang="en-US" dirty="0" smtClean="0"/>
+              <a:t>jQuery</a:t>
+            </a:r>
+            <a:r>
+              <a:rPr lang="en-US" dirty="0" smtClean="0"/>
+              <a:t>/CSS</a:t>
+            </a:r>
+            <a:endParaRPr lang="en-US" dirty="0" smtClean="0"/>
           </a:p>
         </p:txBody>
       </p:sp>
@@ -4924,7 +4923,11 @@
           <a:p>
             <a:r>
               <a:rPr lang="en-US" dirty="0" smtClean="0"/>
-              <a:t>Ajax/JSON</a:t>
+              <a:t>Ajax/</a:t>
+            </a:r>
+            <a:r>
+              <a:rPr lang="en-US" dirty="0" smtClean="0"/>
+              <a:t>JSON</a:t>
             </a:r>
           </a:p>
         </p:txBody>
@@ -5060,7 +5063,6 @@
               <a:rPr lang="en-US" dirty="0" smtClean="0"/>
               <a:t>PHP/JSON</a:t>
             </a:r>
-            <a:endParaRPr lang="en-US" dirty="0" smtClean="0"/>
           </a:p>
         </p:txBody>
       </p:sp>
@@ -5177,11 +5179,7 @@
           <a:p>
             <a:r>
               <a:rPr lang="en-US" dirty="0" smtClean="0"/>
-              <a:t>Prototype </a:t>
-            </a:r>
-            <a:r>
-              <a:rPr lang="en-US" dirty="0" smtClean="0"/>
-              <a:t>Code</a:t>
+              <a:t>Prototype Code</a:t>
             </a:r>
             <a:endParaRPr lang="en-US" dirty="0"/>
           </a:p>
@@ -5225,7 +5223,11 @@
             </a:pPr>
             <a:r>
               <a:rPr lang="en-US" dirty="0" smtClean="0"/>
-              <a:t>52 html files</a:t>
+              <a:t>55 </a:t>
+            </a:r>
+            <a:r>
+              <a:rPr lang="en-US" dirty="0" smtClean="0"/>
+              <a:t>html files</a:t>
             </a:r>
           </a:p>
           <a:p>
@@ -5235,15 +5237,15 @@
             </a:pPr>
             <a:r>
               <a:rPr lang="en-US" dirty="0" smtClean="0"/>
-              <a:t>39 </a:t>
-            </a:r>
-            <a:r>
-              <a:rPr lang="en-US" dirty="0" smtClean="0"/>
-              <a:t>php</a:t>
-            </a:r>
-            <a:r>
-              <a:rPr lang="en-US" dirty="0" smtClean="0"/>
-              <a:t> files</a:t>
+              <a:t>42</a:t>
+            </a:r>
+            <a:r>
+              <a:rPr lang="en-US" dirty="0" smtClean="0"/>
+              <a:t> </a:t>
+            </a:r>
+            <a:r>
+              <a:rPr lang="en-US" dirty="0" smtClean="0"/>
+              <a:t>php files</a:t>
             </a:r>
           </a:p>
           <a:p>
@@ -5252,16 +5254,16 @@
               <a:buChar char="•"/>
             </a:pPr>
             <a:r>
-              <a:rPr lang="en-US" dirty="0" smtClean="0"/>
-              <a:t>4 </a:t>
-            </a:r>
-            <a:r>
-              <a:rPr lang="en-US" dirty="0" smtClean="0"/>
-              <a:t>css</a:t>
-            </a:r>
-            <a:r>
-              <a:rPr lang="en-US" dirty="0" smtClean="0"/>
-              <a:t> files</a:t>
+              <a:rPr lang="en-US" dirty="0"/>
+              <a:t>2</a:t>
+            </a:r>
+            <a:r>
+              <a:rPr lang="en-US" dirty="0" smtClean="0"/>
+              <a:t> </a:t>
+            </a:r>
+            <a:r>
+              <a:rPr lang="en-US" dirty="0" smtClean="0"/>
+              <a:t>css files</a:t>
             </a:r>
           </a:p>
           <a:p>
@@ -5275,23 +5277,7 @@
             </a:r>
             <a:r>
               <a:rPr lang="en-US" dirty="0"/>
-              <a:t>https://</a:t>
-            </a:r>
-            <a:r>
-              <a:rPr lang="en-US" dirty="0"/>
-              <a:t>github.com</a:t>
-            </a:r>
-            <a:r>
-              <a:rPr lang="en-US" dirty="0"/>
-              <a:t>/</a:t>
-            </a:r>
-            <a:r>
-              <a:rPr lang="en-US" dirty="0"/>
-              <a:t>MissionSE</a:t>
-            </a:r>
-            <a:r>
-              <a:rPr lang="en-US" dirty="0"/>
-              <a:t>/Initiatives</a:t>
+              <a:t>https://github.com/MissionSE/Initiatives</a:t>
             </a:r>
             <a:endParaRPr lang="en-US" dirty="0" smtClean="0"/>
           </a:p>
@@ -5409,11 +5395,7 @@
             <a:pPr marL="0" indent="0"/>
             <a:r>
               <a:rPr lang="en-US" dirty="0" smtClean="0"/>
-              <a:t>View </a:t>
-            </a:r>
-            <a:r>
-              <a:rPr lang="en-US" dirty="0" smtClean="0"/>
-              <a:t>Control</a:t>
+              <a:t>View Control</a:t>
             </a:r>
           </a:p>
           <a:p>
@@ -5728,7 +5710,7 @@
         <p:spPr/>
         <p:txBody>
           <a:bodyPr>
-            <a:normAutofit fontScale="85000" lnSpcReduction="20000"/>
+            <a:normAutofit fontScale="77500" lnSpcReduction="20000"/>
           </a:bodyPr>
           <a:lstStyle/>
           <a:p>
@@ -5768,11 +5750,7 @@
             </a:pPr>
             <a:r>
               <a:rPr lang="en-US" dirty="0" smtClean="0"/>
-              <a:t>Image files dynamically requested from </a:t>
-            </a:r>
-            <a:r>
-              <a:rPr lang="en-US" dirty="0" smtClean="0"/>
-              <a:t>website</a:t>
+              <a:t>Image files dynamically requested from website</a:t>
             </a:r>
           </a:p>
           <a:p>
@@ -5782,21 +5760,8 @@
             </a:pPr>
             <a:r>
               <a:rPr lang="en-US" dirty="0"/>
-              <a:t>http://</a:t>
-            </a:r>
-            <a:r>
-              <a:rPr lang="en-US" dirty="0"/>
-              <a:t>dev.bridgeborn.com</a:t>
-            </a:r>
-            <a:r>
-              <a:rPr lang="en-US" dirty="0"/>
-              <a:t>/</a:t>
-            </a:r>
-            <a:r>
-              <a:rPr lang="en-US" dirty="0"/>
-              <a:t>symbology</a:t>
-            </a:r>
-            <a:endParaRPr lang="en-US" dirty="0"/>
+              <a:t>http://dev.bridgeborn.com/symbology</a:t>
+            </a:r>
           </a:p>
           <a:p>
             <a:pPr lvl="1">
@@ -5817,7 +5782,6 @@
               <a:rPr lang="en-US" dirty="0" smtClean="0"/>
               <a:t>Simulator</a:t>
             </a:r>
-            <a:endParaRPr lang="en-US" dirty="0" smtClean="0"/>
           </a:p>
           <a:p>
             <a:pPr lvl="1">
@@ -5838,7 +5802,6 @@
               <a:rPr lang="en-US" dirty="0" smtClean="0"/>
               <a:t>Tags</a:t>
             </a:r>
-            <a:endParaRPr lang="en-US" dirty="0" smtClean="0"/>
           </a:p>
           <a:p>
             <a:pPr lvl="1">
@@ -5847,11 +5810,7 @@
             </a:pPr>
             <a:r>
               <a:rPr lang="en-US" dirty="0" smtClean="0"/>
-              <a:t>Filter </a:t>
-            </a:r>
-            <a:r>
-              <a:rPr lang="en-US" dirty="0" smtClean="0"/>
-              <a:t>(category and id)</a:t>
+              <a:t>Filter (category and id)</a:t>
             </a:r>
           </a:p>
           <a:p>
@@ -5909,11 +5868,7 @@
             </a:pPr>
             <a:r>
               <a:rPr lang="en-US" dirty="0" smtClean="0"/>
-              <a:t>View tour created in standalone </a:t>
-            </a:r>
-            <a:r>
-              <a:rPr lang="en-US" dirty="0" smtClean="0"/>
-              <a:t>application</a:t>
+              <a:t>View tour created in standalone application</a:t>
             </a:r>
           </a:p>
           <a:p>
@@ -5933,23 +5888,21 @@
             </a:pPr>
             <a:r>
               <a:rPr lang="en-US" dirty="0" smtClean="0"/>
-              <a:t>Save </a:t>
-            </a:r>
-            <a:r>
-              <a:rPr lang="en-US" dirty="0" smtClean="0"/>
-              <a:t>lat</a:t>
-            </a:r>
-            <a:r>
-              <a:rPr lang="en-US" dirty="0" smtClean="0"/>
-              <a:t>/</a:t>
-            </a:r>
-            <a:r>
-              <a:rPr lang="en-US" dirty="0" smtClean="0"/>
-              <a:t>lon</a:t>
-            </a:r>
-            <a:r>
-              <a:rPr lang="en-US" dirty="0" smtClean="0"/>
-              <a:t>, range, camera tilt of selected locations for playback via KML</a:t>
+              <a:t>Save lat/lon, range, camera tilt of selected locations for playback via </a:t>
+            </a:r>
+            <a:r>
+              <a:rPr lang="en-US" dirty="0" smtClean="0"/>
+              <a:t>KML</a:t>
+            </a:r>
+          </a:p>
+          <a:p>
+            <a:pPr>
+              <a:buFont typeface="Arial"/>
+              <a:buChar char="•"/>
+            </a:pPr>
+            <a:r>
+              <a:rPr lang="en-US" dirty="0" smtClean="0"/>
+              <a:t>Add/Delete operator entered avoidance areas</a:t>
             </a:r>
             <a:endParaRPr lang="en-US" dirty="0"/>
           </a:p>

</xml_diff>